<commit_message>
fixing typo in diagram
</commit_message>
<xml_diff>
--- a/pattern/service-discovery-fargate-microservice-cloud-map/diagram.pptx
+++ b/pattern/service-discovery-fargate-microservice-cloud-map/diagram.pptx
@@ -4048,7 +4048,7 @@
         <p:spPr>
           <a:xfrm>
             <a:off x="9056346" y="2248696"/>
-            <a:ext cx="2706254" cy="1908215"/>
+            <a:ext cx="2258707" cy="1107996"/>
           </a:xfrm>
           <a:prstGeom prst="rect">
             <a:avLst/>
@@ -4068,7 +4068,7 @@
                 <a:ea typeface="Amazon Ember" panose="020B0603020204020204" pitchFamily="34" charset="0"/>
                 <a:cs typeface="Amazon Ember" panose="020B0603020204020204" pitchFamily="34" charset="0"/>
               </a:rPr>
-              <a:t>web.production.internal</a:t>
+              <a:t>name.internal</a:t>
             </a:r>
             <a:endParaRPr lang="en-US" sz="1400" dirty="0">
               <a:latin typeface="Amazon Ember" panose="020B0603020204020204" pitchFamily="34" charset="0"/>
@@ -4092,49 +4092,6 @@
                 <a:ea typeface="Amazon Ember" panose="020B0603020204020204" pitchFamily="34" charset="0"/>
                 <a:cs typeface="Amazon Ember" panose="020B0603020204020204" pitchFamily="34" charset="0"/>
               </a:rPr>
-              <a:t>10.0.0.5</a:t>
-            </a:r>
-          </a:p>
-          <a:p>
-            <a:pPr algn="l"/>
-            <a:endParaRPr lang="en-US" sz="1400" dirty="0">
-              <a:latin typeface="Amazon Ember" panose="020B0603020204020204" pitchFamily="34" charset="0"/>
-              <a:ea typeface="Amazon Ember" panose="020B0603020204020204" pitchFamily="34" charset="0"/>
-              <a:cs typeface="Amazon Ember" panose="020B0603020204020204" pitchFamily="34" charset="0"/>
-            </a:endParaRPr>
-          </a:p>
-          <a:p>
-            <a:pPr algn="l"/>
-            <a:r>
-              <a:rPr lang="en-US" sz="1400" dirty="0" err="1">
-                <a:latin typeface="Amazon Ember" panose="020B0603020204020204" pitchFamily="34" charset="0"/>
-                <a:ea typeface="Amazon Ember" panose="020B0603020204020204" pitchFamily="34" charset="0"/>
-                <a:cs typeface="Amazon Ember" panose="020B0603020204020204" pitchFamily="34" charset="0"/>
-              </a:rPr>
-              <a:t>api.production.internal</a:t>
-            </a:r>
-            <a:endParaRPr lang="en-US" sz="1400" dirty="0">
-              <a:latin typeface="Amazon Ember" panose="020B0603020204020204" pitchFamily="34" charset="0"/>
-              <a:ea typeface="Amazon Ember" panose="020B0603020204020204" pitchFamily="34" charset="0"/>
-              <a:cs typeface="Amazon Ember" panose="020B0603020204020204" pitchFamily="34" charset="0"/>
-            </a:endParaRPr>
-          </a:p>
-          <a:p>
-            <a:pPr algn="l"/>
-            <a:endParaRPr lang="en-US" sz="1000" dirty="0">
-              <a:latin typeface="Amazon Ember" panose="020B0603020204020204" pitchFamily="34" charset="0"/>
-              <a:ea typeface="Amazon Ember" panose="020B0603020204020204" pitchFamily="34" charset="0"/>
-              <a:cs typeface="Amazon Ember" panose="020B0603020204020204" pitchFamily="34" charset="0"/>
-            </a:endParaRPr>
-          </a:p>
-          <a:p>
-            <a:pPr algn="l"/>
-            <a:r>
-              <a:rPr lang="en-US" sz="1400" dirty="0">
-                <a:latin typeface="Amazon Ember" panose="020B0603020204020204" pitchFamily="34" charset="0"/>
-                <a:ea typeface="Amazon Ember" panose="020B0603020204020204" pitchFamily="34" charset="0"/>
-                <a:cs typeface="Amazon Ember" panose="020B0603020204020204" pitchFamily="34" charset="0"/>
-              </a:rPr>
               <a:t>10.0.0.6</a:t>
             </a:r>
           </a:p>
@@ -4176,7 +4133,7 @@
         <p:spPr>
           <a:xfrm>
             <a:off x="8853193" y="1413344"/>
-            <a:ext cx="2838375" cy="2999789"/>
+            <a:ext cx="2838375" cy="2138027"/>
           </a:xfrm>
           <a:prstGeom prst="rect">
             <a:avLst/>
@@ -4285,8 +4242,8 @@
           <p:nvPr/>
         </p:nvSpPr>
         <p:spPr>
-          <a:xfrm rot="1810602">
-            <a:off x="7414899" y="2230208"/>
+          <a:xfrm rot="1272414">
+            <a:off x="7396248" y="2041341"/>
             <a:ext cx="1502098" cy="369332"/>
           </a:xfrm>
           <a:prstGeom prst="rect">
@@ -4325,7 +4282,7 @@
         <p:spPr>
           <a:xfrm>
             <a:off x="7006281" y="1992024"/>
-            <a:ext cx="2050065" cy="1210780"/>
+            <a:ext cx="2050065" cy="810670"/>
           </a:xfrm>
           <a:prstGeom prst="straightConnector1">
             <a:avLst/>

</xml_diff>